<commit_message>
fixed type on poster
</commit_message>
<xml_diff>
--- a/CS224N_Project_Poster.pptx
+++ b/CS224N_Project_Poster.pptx
@@ -3188,14 +3188,14 @@
           </a:ln>
           <a:extLst>
             <a:ext uri="{909E8E84-426E-40dd-AFC4-6F175D3DCCD1}">
-              <a14:hiddenFill xmlns:a14="http://schemas.microsoft.com/office/drawing/2010/main" xmlns="">
+              <a14:hiddenFill xmlns="" xmlns:a14="http://schemas.microsoft.com/office/drawing/2010/main">
                 <a:solidFill>
                   <a:srgbClr val="FFFFFF"/>
                 </a:solidFill>
               </a14:hiddenFill>
             </a:ext>
             <a:ext uri="{91240B29-F687-4f45-9708-019B960494DF}">
-              <a14:hiddenLine xmlns:a14="http://schemas.microsoft.com/office/drawing/2010/main" xmlns="" w="9525">
+              <a14:hiddenLine xmlns="" xmlns:a14="http://schemas.microsoft.com/office/drawing/2010/main" w="9525">
                 <a:solidFill>
                   <a:srgbClr val="000000"/>
                 </a:solidFill>
@@ -3205,7 +3205,7 @@
               </a14:hiddenLine>
             </a:ext>
             <a:ext uri="{FAA26D3D-D897-4be2-8F04-BA451C77F1D7}">
-              <ma14:placeholderFlag xmlns:ma14="http://schemas.microsoft.com/office/mac/drawingml/2011/main" xmlns="" val="1"/>
+              <ma14:placeholderFlag xmlns="" xmlns:ma14="http://schemas.microsoft.com/office/mac/drawingml/2011/main" val="1"/>
             </a:ext>
           </a:extLst>
         </p:spPr>
@@ -3249,14 +3249,14 @@
           </a:ln>
           <a:extLst>
             <a:ext uri="{909E8E84-426E-40dd-AFC4-6F175D3DCCD1}">
-              <a14:hiddenFill xmlns:a14="http://schemas.microsoft.com/office/drawing/2010/main" xmlns="">
+              <a14:hiddenFill xmlns="" xmlns:a14="http://schemas.microsoft.com/office/drawing/2010/main">
                 <a:solidFill>
                   <a:srgbClr val="FFFFFF"/>
                 </a:solidFill>
               </a14:hiddenFill>
             </a:ext>
             <a:ext uri="{91240B29-F687-4f45-9708-019B960494DF}">
-              <a14:hiddenLine xmlns:a14="http://schemas.microsoft.com/office/drawing/2010/main" xmlns="" w="9525">
+              <a14:hiddenLine xmlns="" xmlns:a14="http://schemas.microsoft.com/office/drawing/2010/main" w="9525">
                 <a:solidFill>
                   <a:srgbClr val="000000"/>
                 </a:solidFill>
@@ -3266,7 +3266,7 @@
               </a14:hiddenLine>
             </a:ext>
             <a:ext uri="{FAA26D3D-D897-4be2-8F04-BA451C77F1D7}">
-              <ma14:placeholderFlag xmlns:ma14="http://schemas.microsoft.com/office/mac/drawingml/2011/main" xmlns="" val="1"/>
+              <ma14:placeholderFlag xmlns="" xmlns:ma14="http://schemas.microsoft.com/office/mac/drawingml/2011/main" val="1"/>
             </a:ext>
           </a:extLst>
         </p:spPr>
@@ -4707,14 +4707,14 @@
           </a:ln>
           <a:extLst>
             <a:ext uri="{909E8E84-426E-40dd-AFC4-6F175D3DCCD1}">
-              <a14:hiddenFill xmlns:a14="http://schemas.microsoft.com/office/drawing/2010/main" xmlns="">
+              <a14:hiddenFill xmlns="" xmlns:a14="http://schemas.microsoft.com/office/drawing/2010/main">
                 <a:solidFill>
                   <a:srgbClr val="FFFFFF"/>
                 </a:solidFill>
               </a14:hiddenFill>
             </a:ext>
             <a:ext uri="{91240B29-F687-4f45-9708-019B960494DF}">
-              <a14:hiddenLine xmlns:a14="http://schemas.microsoft.com/office/drawing/2010/main" xmlns="" w="9525">
+              <a14:hiddenLine xmlns="" xmlns:a14="http://schemas.microsoft.com/office/drawing/2010/main" w="9525">
                 <a:solidFill>
                   <a:srgbClr val="000000"/>
                 </a:solidFill>
@@ -4851,7 +4851,7 @@
           </a:ln>
           <a:extLst>
             <a:ext uri="{91240B29-F687-4f45-9708-019B960494DF}">
-              <a14:hiddenLine xmlns:a14="http://schemas.microsoft.com/office/drawing/2010/main" xmlns="" w="9525">
+              <a14:hiddenLine xmlns="" xmlns:a14="http://schemas.microsoft.com/office/drawing/2010/main" w="9525">
                 <a:solidFill>
                   <a:srgbClr val="000000"/>
                 </a:solidFill>
@@ -4902,14 +4902,14 @@
           </a:ln>
           <a:extLst>
             <a:ext uri="{909E8E84-426E-40dd-AFC4-6F175D3DCCD1}">
-              <a14:hiddenFill xmlns:a14="http://schemas.microsoft.com/office/drawing/2010/main" xmlns="">
+              <a14:hiddenFill xmlns="" xmlns:a14="http://schemas.microsoft.com/office/drawing/2010/main">
                 <a:solidFill>
                   <a:srgbClr val="FFFFFF"/>
                 </a:solidFill>
               </a14:hiddenFill>
             </a:ext>
             <a:ext uri="{91240B29-F687-4f45-9708-019B960494DF}">
-              <a14:hiddenLine xmlns:a14="http://schemas.microsoft.com/office/drawing/2010/main" xmlns="" w="9525">
+              <a14:hiddenLine xmlns="" xmlns:a14="http://schemas.microsoft.com/office/drawing/2010/main" w="9525">
                 <a:solidFill>
                   <a:srgbClr val="000000"/>
                 </a:solidFill>
@@ -4973,14 +4973,14 @@
           </a:ln>
           <a:extLst>
             <a:ext uri="{909E8E84-426E-40dd-AFC4-6F175D3DCCD1}">
-              <a14:hiddenFill xmlns:a14="http://schemas.microsoft.com/office/drawing/2010/main" xmlns="">
+              <a14:hiddenFill xmlns="" xmlns:a14="http://schemas.microsoft.com/office/drawing/2010/main">
                 <a:solidFill>
                   <a:srgbClr val="FFFFFF"/>
                 </a:solidFill>
               </a14:hiddenFill>
             </a:ext>
             <a:ext uri="{91240B29-F687-4f45-9708-019B960494DF}">
-              <a14:hiddenLine xmlns:a14="http://schemas.microsoft.com/office/drawing/2010/main" xmlns="" w="9525">
+              <a14:hiddenLine xmlns="" xmlns:a14="http://schemas.microsoft.com/office/drawing/2010/main" w="9525">
                 <a:solidFill>
                   <a:srgbClr val="000000"/>
                 </a:solidFill>
@@ -5105,7 +5105,7 @@
           </a:ln>
           <a:extLst>
             <a:ext uri="{91240B29-F687-4f45-9708-019B960494DF}">
-              <a14:hiddenLine xmlns:a14="http://schemas.microsoft.com/office/drawing/2010/main" xmlns="" w="9525">
+              <a14:hiddenLine xmlns="" xmlns:a14="http://schemas.microsoft.com/office/drawing/2010/main" w="9525">
                 <a:solidFill>
                   <a:srgbClr val="000000"/>
                 </a:solidFill>
@@ -5158,7 +5158,7 @@
           </a:ln>
           <a:extLst>
             <a:ext uri="{91240B29-F687-4f45-9708-019B960494DF}">
-              <a14:hiddenLine xmlns:a14="http://schemas.microsoft.com/office/drawing/2010/main" xmlns="" w="9525">
+              <a14:hiddenLine xmlns="" xmlns:a14="http://schemas.microsoft.com/office/drawing/2010/main" w="9525">
                 <a:solidFill>
                   <a:srgbClr val="000000"/>
                 </a:solidFill>
@@ -5211,7 +5211,7 @@
           </a:ln>
           <a:extLst>
             <a:ext uri="{91240B29-F687-4f45-9708-019B960494DF}">
-              <a14:hiddenLine xmlns:a14="http://schemas.microsoft.com/office/drawing/2010/main" xmlns="" w="9525">
+              <a14:hiddenLine xmlns="" xmlns:a14="http://schemas.microsoft.com/office/drawing/2010/main" w="9525">
                 <a:solidFill>
                   <a:srgbClr val="000000"/>
                 </a:solidFill>
@@ -5264,7 +5264,7 @@
           </a:ln>
           <a:extLst>
             <a:ext uri="{91240B29-F687-4f45-9708-019B960494DF}">
-              <a14:hiddenLine xmlns:a14="http://schemas.microsoft.com/office/drawing/2010/main" xmlns="" w="9525">
+              <a14:hiddenLine xmlns="" xmlns:a14="http://schemas.microsoft.com/office/drawing/2010/main" w="9525">
                 <a:solidFill>
                   <a:srgbClr val="000000"/>
                 </a:solidFill>
@@ -5831,7 +5831,7 @@
           </a:ln>
           <a:extLst>
             <a:ext uri="{91240B29-F687-4f45-9708-019B960494DF}">
-              <a14:hiddenLine xmlns:a14="http://schemas.microsoft.com/office/drawing/2010/main" xmlns="" w="9525">
+              <a14:hiddenLine xmlns="" xmlns:a14="http://schemas.microsoft.com/office/drawing/2010/main" w="9525">
                 <a:solidFill>
                   <a:srgbClr val="000000"/>
                 </a:solidFill>
@@ -6722,15 +6722,15 @@
             <a:pPr algn="just"/>
             <a:r>
               <a:rPr lang="en-US" sz="2400" dirty="0"/>
-              <a:t>In conclusion, we were able to significantly improve on the baseline model, achieving a maximum F1 score of ????? and an EM score of ?????? on the test set.  We noticed that although bidirectional attention with the modeling layer provided the majority of the improvements, the attention and modeling separately had minimal effects.  We also saw that the character </a:t>
-            </a:r>
-            <a:r>
-              <a:rPr lang="en-US" sz="2400" dirty="0" err="1"/>
-              <a:t>leve</a:t>
+              <a:t>In conclusion, we were able to significantly improve on the baseline model, achieving a maximum F1 score of ????? and an EM score of ?????? on the test set.  We noticed that although bidirectional attention with the modeling layer provided the majority of the improvements, the attention and modeling separately had minimal effects.  We also saw that the </a:t>
+            </a:r>
+            <a:r>
+              <a:rPr lang="en-US" sz="2400"/>
+              <a:t>character level </a:t>
             </a:r>
             <a:r>
               <a:rPr lang="en-US" sz="2400" dirty="0"/>
-              <a:t> CNN tended to improve models by about 2% in the F1 score.  </a:t>
+              <a:t>CNN tended to improve models by about 2% in the F1 score.  </a:t>
             </a:r>
           </a:p>
           <a:p>
@@ -6741,13 +6741,8 @@
             <a:pPr algn="just"/>
             <a:r>
               <a:rPr lang="en-US" sz="2400" dirty="0"/>
-              <a:t>In the future, there are many further improvements we can try.  For example, it is possible to condition the end prediction on the start prediction.  It might also be useful to take multiple models and ensemble them using a </a:t>
-            </a:r>
-            <a:r>
-              <a:rPr lang="en-US" sz="2400"/>
-              <a:t>voting scheme.</a:t>
-            </a:r>
-            <a:endParaRPr lang="en-US" sz="2400" dirty="0"/>
+              <a:t>In the future, there are many further improvements we can try.  For example, it is possible to condition the end prediction on the start prediction.  It might also be useful to take multiple models and ensemble them using a voting scheme.</a:t>
+            </a:r>
           </a:p>
         </p:txBody>
       </p:sp>

</xml_diff>